<commit_message>
Fix up the agenda.
</commit_message>
<xml_diff>
--- a/slides/Week8a.pptx
+++ b/slides/Week8a.pptx
@@ -14982,15 +14982,7 @@
                 <a:ea typeface="ヒラギノ角ゴ ProN W6" charset="0"/>
                 <a:cs typeface="ヒラギノ角ゴ ProN W6" charset="0"/>
               </a:rPr>
-              <a:t>1. PREDICTING A NUMBER FROM CATEGORICAL </a:t>
-            </a:r>
-            <a:r>
-              <a:rPr lang="en-US" sz="2000" dirty="0" smtClean="0">
-                <a:latin typeface="PFDinTextCompPro-Bold" charset="0"/>
-                <a:ea typeface="ヒラギノ角ゴ ProN W6" charset="0"/>
-                <a:cs typeface="ヒラギノ角ゴ ProN W6" charset="0"/>
-              </a:rPr>
-              <a:t>DATA </a:t>
+              <a:t>1. PREDICTING A NUMBER FROM CATEGORICAL DATA </a:t>
             </a:r>
             <a:br>
               <a:rPr lang="en-US" sz="2000" dirty="0" smtClean="0">
@@ -15005,31 +14997,7 @@
                 <a:ea typeface="ヒラギノ角ゴ ProN W6" charset="0"/>
                 <a:cs typeface="ヒラギノ角ゴ ProN W6" charset="0"/>
               </a:rPr>
-              <a:t>2. </a:t>
-            </a:r>
-            <a:r>
-              <a:rPr lang="en-US" sz="2000" dirty="0" smtClean="0">
-                <a:latin typeface="PFDinTextCompPro-Bold" charset="0"/>
-                <a:ea typeface="ヒラギノ角ゴ ProN W6" charset="0"/>
-                <a:cs typeface="ヒラギノ角ゴ ProN W6" charset="0"/>
-              </a:rPr>
-              <a:t>probability </a:t>
-            </a:r>
-            <a:r>
-              <a:rPr lang="en-US" sz="2000" dirty="0" smtClean="0">
-                <a:latin typeface="PFDinTextCompPro-Bold" charset="0"/>
-                <a:ea typeface="ヒラギノ角ゴ ProN W6" charset="0"/>
-                <a:cs typeface="ヒラギノ角ゴ ProN W6" charset="0"/>
-              </a:rPr>
-              <a:t>and Bayes’ </a:t>
-            </a:r>
-            <a:r>
-              <a:rPr lang="en-US" sz="2000" dirty="0" smtClean="0">
-                <a:latin typeface="PFDinTextCompPro-Bold" charset="0"/>
-                <a:ea typeface="ヒラギノ角ゴ ProN W6" charset="0"/>
-                <a:cs typeface="ヒラギノ角ゴ ProN W6" charset="0"/>
-              </a:rPr>
-              <a:t>Theorem</a:t>
+              <a:t>2. probability and Bayes’ Theorem</a:t>
             </a:r>
             <a:r>
               <a:rPr lang="en-US" sz="2000" dirty="0">
@@ -15060,7 +15028,31 @@
                 <a:ea typeface="ヒラギノ角ゴ ProN W6" charset="0"/>
                 <a:cs typeface="ヒラギノ角ゴ ProN W6" charset="0"/>
               </a:rPr>
-              <a:t>PREDICTING A CATEGORY FROM A CATEGORICAL FEATURE</a:t>
+              <a:t>PREDICTING A CATEGORY </a:t>
+            </a:r>
+            <a:r>
+              <a:rPr lang="en-US" sz="1800" b="0" smtClean="0">
+                <a:latin typeface="PFDinTextCompPro-Bold" charset="0"/>
+                <a:ea typeface="ヒラギノ角ゴ ProN W6" charset="0"/>
+                <a:cs typeface="ヒラギノ角ゴ ProN W6" charset="0"/>
+              </a:rPr>
+              <a:t>FROM </a:t>
+            </a:r>
+            <a:r>
+              <a:rPr lang="en-US" sz="1800" b="0" smtClean="0">
+                <a:latin typeface="PFDinTextCompPro-Bold" charset="0"/>
+                <a:ea typeface="ヒラギノ角ゴ ProN W6" charset="0"/>
+                <a:cs typeface="ヒラギノ角ゴ ProN W6" charset="0"/>
+              </a:rPr>
+              <a:t>ONE </a:t>
+            </a:r>
+            <a:r>
+              <a:rPr lang="en-US" sz="1800" b="0" dirty="0" smtClean="0">
+                <a:latin typeface="PFDinTextCompPro-Bold" charset="0"/>
+                <a:ea typeface="ヒラギノ角ゴ ProN W6" charset="0"/>
+                <a:cs typeface="ヒラギノ角ゴ ProN W6" charset="0"/>
+              </a:rPr>
+              <a:t>CATEGORICAL FEATURE</a:t>
             </a:r>
             <a:r>
               <a:rPr lang="en-US" sz="1800" dirty="0" smtClean="0">
@@ -15083,31 +15075,7 @@
                 <a:ea typeface="ヒラギノ角ゴ ProN W6" charset="0"/>
                 <a:cs typeface="ヒラギノ角ゴ ProN W6" charset="0"/>
               </a:rPr>
-              <a:t>3</a:t>
-            </a:r>
-            <a:r>
-              <a:rPr lang="en-US" sz="2000" dirty="0" smtClean="0">
-                <a:latin typeface="PFDinTextCompPro-Bold" charset="0"/>
-                <a:ea typeface="ヒラギノ角ゴ ProN W6" charset="0"/>
-                <a:cs typeface="ヒラギノ角ゴ ProN W6" charset="0"/>
-              </a:rPr>
-              <a:t>. </a:t>
-            </a:r>
-            <a:r>
-              <a:rPr lang="en-US" sz="2000" dirty="0" smtClean="0">
-                <a:latin typeface="PFDinTextCompPro-Bold" charset="0"/>
-                <a:ea typeface="ヒラギノ角ゴ ProN W6" charset="0"/>
-                <a:cs typeface="ヒラギノ角ゴ ProN W6" charset="0"/>
-              </a:rPr>
-              <a:t>Naïve Bayes </a:t>
-            </a:r>
-            <a:r>
-              <a:rPr lang="en-US" sz="2000" dirty="0" smtClean="0">
-                <a:latin typeface="PFDinTextCompPro-Bold" charset="0"/>
-                <a:ea typeface="ヒラギノ角ゴ ProN W6" charset="0"/>
-                <a:cs typeface="ヒラギノ角ゴ ProN W6" charset="0"/>
-              </a:rPr>
-              <a:t>classification:</a:t>
+              <a:t>3. Naïve Bayes classification:</a:t>
             </a:r>
             <a:br>
               <a:rPr lang="en-US" sz="2000" dirty="0" smtClean="0">
@@ -15139,37 +15107,6 @@
                 <a:cs typeface="ヒラギノ角ゴ ProN W6" charset="0"/>
               </a:rPr>
             </a:br>
-            <a:r>
-              <a:rPr lang="en-US" sz="2000" dirty="0" smtClean="0">
-                <a:latin typeface="PFDinTextCompPro-Bold" charset="0"/>
-                <a:ea typeface="ヒラギノ角ゴ ProN W6" charset="0"/>
-                <a:cs typeface="ヒラギノ角ゴ ProN W6" charset="0"/>
-              </a:rPr>
-              <a:t>4. BAYESIAN NETWORKS: </a:t>
-            </a:r>
-            <a:br>
-              <a:rPr lang="en-US" sz="2000" dirty="0" smtClean="0">
-                <a:latin typeface="PFDinTextCompPro-Bold" charset="0"/>
-                <a:ea typeface="ヒラギノ角ゴ ProN W6" charset="0"/>
-                <a:cs typeface="ヒラギノ角ゴ ProN W6" charset="0"/>
-              </a:rPr>
-            </a:br>
-            <a:r>
-              <a:rPr lang="en-US" sz="2000" dirty="0">
-                <a:latin typeface="PFDinTextCompPro-Bold" charset="0"/>
-                <a:ea typeface="ヒラギノ角ゴ ProN W6" charset="0"/>
-                <a:cs typeface="ヒラギノ角ゴ ProN W6" charset="0"/>
-              </a:rPr>
-              <a:t>	</a:t>
-            </a:r>
-            <a:r>
-              <a:rPr lang="en-US" sz="1800" b="0" dirty="0" smtClean="0">
-                <a:latin typeface="PFDinTextCompPro-Bold" charset="0"/>
-                <a:ea typeface="ヒラギノ角ゴ ProN W6" charset="0"/>
-                <a:cs typeface="ヒラギノ角ゴ ProN W6" charset="0"/>
-              </a:rPr>
-              <a:t>BEING LESS NAIVE</a:t>
-            </a:r>
             <a:endParaRPr lang="en-US" sz="1800" b="0" cap="none" dirty="0">
               <a:latin typeface="PFDinTextCompPro-Bold" charset="0"/>
               <a:ea typeface="ヒラギノ角ゴ ProN W6" charset="0"/>
@@ -21141,7 +21078,6 @@
               <a:rPr lang="en-US" dirty="0" smtClean="0"/>
               <a:t>IF YOU HAVE LOTS OF DATA</a:t>
             </a:r>
-            <a:endParaRPr lang="en-US" dirty="0" smtClean="0"/>
           </a:p>
         </p:txBody>
       </p:sp>
@@ -21233,10 +21169,6 @@
               </a:rPr>
               <a:t>Works if you have data for every combination of category</a:t>
             </a:r>
-            <a:endParaRPr lang="en-US" sz="2300" dirty="0" smtClean="0">
-              <a:latin typeface="PFDinTextCompPro-Italic"/>
-              <a:cs typeface="PFDinTextCompPro-Italic"/>
-            </a:endParaRPr>
           </a:p>
         </p:txBody>
       </p:sp>
@@ -22106,11 +22038,7 @@
             </a:br>
             <a:r>
               <a:rPr lang="en-US" sz="7500" dirty="0" smtClean="0"/>
-              <a:t>probability </a:t>
-            </a:r>
-            <a:r>
-              <a:rPr lang="en-US" sz="7500" dirty="0" smtClean="0"/>
-              <a:t>And</a:t>
+              <a:t>probability And</a:t>
             </a:r>
             <a:br>
               <a:rPr lang="en-US" sz="7500" dirty="0" smtClean="0"/>

</xml_diff>